<commit_message>
Fix Juniper solution documents with proper formatting and content standards
- Solution Briefing: Enforce max 3 sub-items per main item with <13 words each in Solution Overview
- Statement of Work: Add contextual text to all header sections
- Statement of Work: Enhance content density to match AWS IDP template standards
- Statement of Work: Remove presentation layout references
- Regenerate all presales documents for both SRX Firewall and Mist AI Network solutions
</commit_message>
<xml_diff>
--- a/solutions/juniper/cyber-security/srx-firewall-platform/presales/solution-briefing.pptx
+++ b/solutions/juniper/cyber-security/srx-firewall-platform/presales/solution-briefing.pptx
@@ -757,6 +757,39 @@
       </p:grpSpPr>
       <p:sp>
         <p:nvSpPr>
+          <p:cNvPr id="12" name="Picture Placeholder 13">
+            <a:extLst>
+              <a:ext uri="{FF2B5EF4-FFF2-40B4-BE49-F238E27FC236}">
+                <a16:creationId xmlns:a16="http://schemas.microsoft.com/office/drawing/2014/main" id="{2DB97592-C4D5-B315-7F11-AA14F6EE8A62}"/>
+              </a:ext>
+            </a:extLst>
+          </p:cNvPr>
+          <p:cNvSpPr>
+            <a:spLocks noGrp="1"/>
+          </p:cNvSpPr>
+          <p:nvPr>
+            <p:ph type="pic" sz="quarter" idx="13"/>
+          </p:nvPr>
+        </p:nvSpPr>
+        <p:spPr>
+          <a:xfrm>
+            <a:off x="313593" y="4536078"/>
+            <a:ext cx="2143858" cy="529698"/>
+          </a:xfrm>
+          <a:prstGeom prst="rect">
+            <a:avLst/>
+          </a:prstGeom>
+        </p:spPr>
+        <p:txBody>
+          <a:bodyPr/>
+          <a:lstStyle/>
+          <a:p>
+            <a:endParaRPr lang="en-US" dirty="0"/>
+          </a:p>
+        </p:txBody>
+      </p:sp>
+      <p:sp>
+        <p:nvSpPr>
           <p:cNvPr id="3" name="Shape 1">
             <a:extLst>
               <a:ext uri="{FF2B5EF4-FFF2-40B4-BE49-F238E27FC236}">
@@ -846,39 +879,6 @@
               <a:rPr lang="en-US" dirty="0"/>
               <a:t>Slide Title</a:t>
             </a:r>
-          </a:p>
-        </p:txBody>
-      </p:sp>
-      <p:sp>
-        <p:nvSpPr>
-          <p:cNvPr id="12" name="Picture Placeholder 13">
-            <a:extLst>
-              <a:ext uri="{FF2B5EF4-FFF2-40B4-BE49-F238E27FC236}">
-                <a16:creationId xmlns:a16="http://schemas.microsoft.com/office/drawing/2014/main" id="{2DB97592-C4D5-B315-7F11-AA14F6EE8A62}"/>
-              </a:ext>
-            </a:extLst>
-          </p:cNvPr>
-          <p:cNvSpPr>
-            <a:spLocks noGrp="1"/>
-          </p:cNvSpPr>
-          <p:nvPr>
-            <p:ph type="pic" sz="quarter" idx="13"/>
-          </p:nvPr>
-        </p:nvSpPr>
-        <p:spPr>
-          <a:xfrm>
-            <a:off x="313593" y="4536078"/>
-            <a:ext cx="2143858" cy="529698"/>
-          </a:xfrm>
-          <a:prstGeom prst="rect">
-            <a:avLst/>
-          </a:prstGeom>
-        </p:spPr>
-        <p:txBody>
-          <a:bodyPr/>
-          <a:lstStyle/>
-          <a:p>
-            <a:endParaRPr lang="en-US" dirty="0"/>
           </a:p>
         </p:txBody>
       </p:sp>
@@ -1035,6 +1035,39 @@
       </p:grpSpPr>
       <p:sp>
         <p:nvSpPr>
+          <p:cNvPr id="12" name="Picture Placeholder 13">
+            <a:extLst>
+              <a:ext uri="{FF2B5EF4-FFF2-40B4-BE49-F238E27FC236}">
+                <a16:creationId xmlns:a16="http://schemas.microsoft.com/office/drawing/2014/main" id="{2DB97592-C4D5-B315-7F11-AA14F6EE8A62}"/>
+              </a:ext>
+            </a:extLst>
+          </p:cNvPr>
+          <p:cNvSpPr>
+            <a:spLocks noGrp="1"/>
+          </p:cNvSpPr>
+          <p:nvPr>
+            <p:ph type="pic" sz="quarter" idx="13"/>
+          </p:nvPr>
+        </p:nvSpPr>
+        <p:spPr>
+          <a:xfrm>
+            <a:off x="313593" y="4536078"/>
+            <a:ext cx="2143858" cy="529698"/>
+          </a:xfrm>
+          <a:prstGeom prst="rect">
+            <a:avLst/>
+          </a:prstGeom>
+        </p:spPr>
+        <p:txBody>
+          <a:bodyPr/>
+          <a:lstStyle/>
+          <a:p>
+            <a:endParaRPr lang="en-US" dirty="0"/>
+          </a:p>
+        </p:txBody>
+      </p:sp>
+      <p:sp>
+        <p:nvSpPr>
           <p:cNvPr id="3" name="Shape 1">
             <a:extLst>
               <a:ext uri="{FF2B5EF4-FFF2-40B4-BE49-F238E27FC236}">
@@ -1124,39 +1157,6 @@
               <a:rPr lang="en-US" dirty="0"/>
               <a:t>Bullet Points</a:t>
             </a:r>
-          </a:p>
-        </p:txBody>
-      </p:sp>
-      <p:sp>
-        <p:nvSpPr>
-          <p:cNvPr id="12" name="Picture Placeholder 13">
-            <a:extLst>
-              <a:ext uri="{FF2B5EF4-FFF2-40B4-BE49-F238E27FC236}">
-                <a16:creationId xmlns:a16="http://schemas.microsoft.com/office/drawing/2014/main" id="{2DB97592-C4D5-B315-7F11-AA14F6EE8A62}"/>
-              </a:ext>
-            </a:extLst>
-          </p:cNvPr>
-          <p:cNvSpPr>
-            <a:spLocks noGrp="1"/>
-          </p:cNvSpPr>
-          <p:nvPr>
-            <p:ph type="pic" sz="quarter" idx="13"/>
-          </p:nvPr>
-        </p:nvSpPr>
-        <p:spPr>
-          <a:xfrm>
-            <a:off x="313593" y="4536078"/>
-            <a:ext cx="2143858" cy="529698"/>
-          </a:xfrm>
-          <a:prstGeom prst="rect">
-            <a:avLst/>
-          </a:prstGeom>
-        </p:spPr>
-        <p:txBody>
-          <a:bodyPr/>
-          <a:lstStyle/>
-          <a:p>
-            <a:endParaRPr lang="en-US" dirty="0"/>
           </a:p>
         </p:txBody>
       </p:sp>
@@ -1299,6 +1299,39 @@
       </p:grpSpPr>
       <p:sp>
         <p:nvSpPr>
+          <p:cNvPr id="10" name="Picture Placeholder 13">
+            <a:extLst>
+              <a:ext uri="{FF2B5EF4-FFF2-40B4-BE49-F238E27FC236}">
+                <a16:creationId xmlns:a16="http://schemas.microsoft.com/office/drawing/2014/main" id="{6A0FA445-7602-F06E-EC73-5504EBF827CC}"/>
+              </a:ext>
+            </a:extLst>
+          </p:cNvPr>
+          <p:cNvSpPr>
+            <a:spLocks noGrp="1"/>
+          </p:cNvSpPr>
+          <p:nvPr>
+            <p:ph type="pic" sz="quarter" idx="14"/>
+          </p:nvPr>
+        </p:nvSpPr>
+        <p:spPr>
+          <a:xfrm>
+            <a:off x="313592" y="4536078"/>
+            <a:ext cx="2121877" cy="529698"/>
+          </a:xfrm>
+          <a:prstGeom prst="rect">
+            <a:avLst/>
+          </a:prstGeom>
+        </p:spPr>
+        <p:txBody>
+          <a:bodyPr/>
+          <a:lstStyle/>
+          <a:p>
+            <a:endParaRPr lang="en-US" dirty="0"/>
+          </a:p>
+        </p:txBody>
+      </p:sp>
+      <p:sp>
+        <p:nvSpPr>
           <p:cNvPr id="3" name="Shape 1">
             <a:extLst>
               <a:ext uri="{FF2B5EF4-FFF2-40B4-BE49-F238E27FC236}">
@@ -1388,39 +1421,6 @@
               <a:rPr lang="en-US" dirty="0"/>
               <a:t>Two Column Layout</a:t>
             </a:r>
-          </a:p>
-        </p:txBody>
-      </p:sp>
-      <p:sp>
-        <p:nvSpPr>
-          <p:cNvPr id="10" name="Picture Placeholder 13">
-            <a:extLst>
-              <a:ext uri="{FF2B5EF4-FFF2-40B4-BE49-F238E27FC236}">
-                <a16:creationId xmlns:a16="http://schemas.microsoft.com/office/drawing/2014/main" id="{6A0FA445-7602-F06E-EC73-5504EBF827CC}"/>
-              </a:ext>
-            </a:extLst>
-          </p:cNvPr>
-          <p:cNvSpPr>
-            <a:spLocks noGrp="1"/>
-          </p:cNvSpPr>
-          <p:nvPr>
-            <p:ph type="pic" sz="quarter" idx="14"/>
-          </p:nvPr>
-        </p:nvSpPr>
-        <p:spPr>
-          <a:xfrm>
-            <a:off x="313592" y="4536078"/>
-            <a:ext cx="2121877" cy="529698"/>
-          </a:xfrm>
-          <a:prstGeom prst="rect">
-            <a:avLst/>
-          </a:prstGeom>
-        </p:spPr>
-        <p:txBody>
-          <a:bodyPr/>
-          <a:lstStyle/>
-          <a:p>
-            <a:endParaRPr lang="en-US" dirty="0"/>
           </a:p>
         </p:txBody>
       </p:sp>
@@ -1668,6 +1668,39 @@
       </p:grpSpPr>
       <p:sp>
         <p:nvSpPr>
+          <p:cNvPr id="12" name="Picture Placeholder 13">
+            <a:extLst>
+              <a:ext uri="{FF2B5EF4-FFF2-40B4-BE49-F238E27FC236}">
+                <a16:creationId xmlns:a16="http://schemas.microsoft.com/office/drawing/2014/main" id="{2DB97592-C4D5-B315-7F11-AA14F6EE8A62}"/>
+              </a:ext>
+            </a:extLst>
+          </p:cNvPr>
+          <p:cNvSpPr>
+            <a:spLocks noGrp="1"/>
+          </p:cNvSpPr>
+          <p:nvPr>
+            <p:ph type="pic" sz="quarter" idx="13"/>
+          </p:nvPr>
+        </p:nvSpPr>
+        <p:spPr>
+          <a:xfrm>
+            <a:off x="313592" y="4536078"/>
+            <a:ext cx="2126273" cy="529698"/>
+          </a:xfrm>
+          <a:prstGeom prst="rect">
+            <a:avLst/>
+          </a:prstGeom>
+        </p:spPr>
+        <p:txBody>
+          <a:bodyPr/>
+          <a:lstStyle/>
+          <a:p>
+            <a:endParaRPr lang="en-US" dirty="0"/>
+          </a:p>
+        </p:txBody>
+      </p:sp>
+      <p:sp>
+        <p:nvSpPr>
           <p:cNvPr id="3" name="Shape 1">
             <a:extLst>
               <a:ext uri="{FF2B5EF4-FFF2-40B4-BE49-F238E27FC236}">
@@ -1783,39 +1816,6 @@
           </a:p>
           <a:p>
             <a:pPr lvl="0"/>
-            <a:endParaRPr lang="en-US" dirty="0"/>
-          </a:p>
-        </p:txBody>
-      </p:sp>
-      <p:sp>
-        <p:nvSpPr>
-          <p:cNvPr id="12" name="Picture Placeholder 13">
-            <a:extLst>
-              <a:ext uri="{FF2B5EF4-FFF2-40B4-BE49-F238E27FC236}">
-                <a16:creationId xmlns:a16="http://schemas.microsoft.com/office/drawing/2014/main" id="{2DB97592-C4D5-B315-7F11-AA14F6EE8A62}"/>
-              </a:ext>
-            </a:extLst>
-          </p:cNvPr>
-          <p:cNvSpPr>
-            <a:spLocks noGrp="1"/>
-          </p:cNvSpPr>
-          <p:nvPr>
-            <p:ph type="pic" sz="quarter" idx="13"/>
-          </p:nvPr>
-        </p:nvSpPr>
-        <p:spPr>
-          <a:xfrm>
-            <a:off x="313592" y="4536078"/>
-            <a:ext cx="2126273" cy="529698"/>
-          </a:xfrm>
-          <a:prstGeom prst="rect">
-            <a:avLst/>
-          </a:prstGeom>
-        </p:spPr>
-        <p:txBody>
-          <a:bodyPr/>
-          <a:lstStyle/>
-          <a:p>
             <a:endParaRPr lang="en-US" dirty="0"/>
           </a:p>
         </p:txBody>
@@ -1927,6 +1927,39 @@
       </p:grpSpPr>
       <p:sp>
         <p:nvSpPr>
+          <p:cNvPr id="10" name="Picture Placeholder 13">
+            <a:extLst>
+              <a:ext uri="{FF2B5EF4-FFF2-40B4-BE49-F238E27FC236}">
+                <a16:creationId xmlns:a16="http://schemas.microsoft.com/office/drawing/2014/main" id="{6A0FA445-7602-F06E-EC73-5504EBF827CC}"/>
+              </a:ext>
+            </a:extLst>
+          </p:cNvPr>
+          <p:cNvSpPr>
+            <a:spLocks noGrp="1"/>
+          </p:cNvSpPr>
+          <p:nvPr>
+            <p:ph type="pic" sz="quarter" idx="14"/>
+          </p:nvPr>
+        </p:nvSpPr>
+        <p:spPr>
+          <a:xfrm>
+            <a:off x="313592" y="4536078"/>
+            <a:ext cx="2130670" cy="529698"/>
+          </a:xfrm>
+          <a:prstGeom prst="rect">
+            <a:avLst/>
+          </a:prstGeom>
+        </p:spPr>
+        <p:txBody>
+          <a:bodyPr/>
+          <a:lstStyle/>
+          <a:p>
+            <a:endParaRPr lang="en-US" dirty="0"/>
+          </a:p>
+        </p:txBody>
+      </p:sp>
+      <p:sp>
+        <p:nvSpPr>
           <p:cNvPr id="3" name="Shape 1">
             <a:extLst>
               <a:ext uri="{FF2B5EF4-FFF2-40B4-BE49-F238E27FC236}">
@@ -2016,39 +2049,6 @@
               <a:rPr lang="en-US" dirty="0"/>
               <a:t>Visual Content</a:t>
             </a:r>
-          </a:p>
-        </p:txBody>
-      </p:sp>
-      <p:sp>
-        <p:nvSpPr>
-          <p:cNvPr id="10" name="Picture Placeholder 13">
-            <a:extLst>
-              <a:ext uri="{FF2B5EF4-FFF2-40B4-BE49-F238E27FC236}">
-                <a16:creationId xmlns:a16="http://schemas.microsoft.com/office/drawing/2014/main" id="{6A0FA445-7602-F06E-EC73-5504EBF827CC}"/>
-              </a:ext>
-            </a:extLst>
-          </p:cNvPr>
-          <p:cNvSpPr>
-            <a:spLocks noGrp="1"/>
-          </p:cNvSpPr>
-          <p:nvPr>
-            <p:ph type="pic" sz="quarter" idx="14"/>
-          </p:nvPr>
-        </p:nvSpPr>
-        <p:spPr>
-          <a:xfrm>
-            <a:off x="313592" y="4536078"/>
-            <a:ext cx="2130670" cy="529698"/>
-          </a:xfrm>
-          <a:prstGeom prst="rect">
-            <a:avLst/>
-          </a:prstGeom>
-        </p:spPr>
-        <p:txBody>
-          <a:bodyPr/>
-          <a:lstStyle/>
-          <a:p>
-            <a:endParaRPr lang="en-US" dirty="0"/>
           </a:p>
         </p:txBody>
       </p:sp>
@@ -2244,6 +2244,39 @@
       </p:grpSpPr>
       <p:sp>
         <p:nvSpPr>
+          <p:cNvPr id="10" name="Picture Placeholder 13">
+            <a:extLst>
+              <a:ext uri="{FF2B5EF4-FFF2-40B4-BE49-F238E27FC236}">
+                <a16:creationId xmlns:a16="http://schemas.microsoft.com/office/drawing/2014/main" id="{6A0FA445-7602-F06E-EC73-5504EBF827CC}"/>
+              </a:ext>
+            </a:extLst>
+          </p:cNvPr>
+          <p:cNvSpPr>
+            <a:spLocks noGrp="1"/>
+          </p:cNvSpPr>
+          <p:nvPr>
+            <p:ph type="pic" sz="quarter" idx="14"/>
+          </p:nvPr>
+        </p:nvSpPr>
+        <p:spPr>
+          <a:xfrm>
+            <a:off x="313592" y="4536078"/>
+            <a:ext cx="2104294" cy="529698"/>
+          </a:xfrm>
+          <a:prstGeom prst="rect">
+            <a:avLst/>
+          </a:prstGeom>
+        </p:spPr>
+        <p:txBody>
+          <a:bodyPr/>
+          <a:lstStyle/>
+          <a:p>
+            <a:endParaRPr lang="en-US" dirty="0"/>
+          </a:p>
+        </p:txBody>
+      </p:sp>
+      <p:sp>
+        <p:nvSpPr>
           <p:cNvPr id="3" name="Shape 1">
             <a:extLst>
               <a:ext uri="{FF2B5EF4-FFF2-40B4-BE49-F238E27FC236}">
@@ -2333,39 +2366,6 @@
               <a:rPr lang="en-US" dirty="0"/>
               <a:t>Data Visualization</a:t>
             </a:r>
-          </a:p>
-        </p:txBody>
-      </p:sp>
-      <p:sp>
-        <p:nvSpPr>
-          <p:cNvPr id="10" name="Picture Placeholder 13">
-            <a:extLst>
-              <a:ext uri="{FF2B5EF4-FFF2-40B4-BE49-F238E27FC236}">
-                <a16:creationId xmlns:a16="http://schemas.microsoft.com/office/drawing/2014/main" id="{6A0FA445-7602-F06E-EC73-5504EBF827CC}"/>
-              </a:ext>
-            </a:extLst>
-          </p:cNvPr>
-          <p:cNvSpPr>
-            <a:spLocks noGrp="1"/>
-          </p:cNvSpPr>
-          <p:nvPr>
-            <p:ph type="pic" sz="quarter" idx="14"/>
-          </p:nvPr>
-        </p:nvSpPr>
-        <p:spPr>
-          <a:xfrm>
-            <a:off x="313592" y="4536078"/>
-            <a:ext cx="2104294" cy="529698"/>
-          </a:xfrm>
-          <a:prstGeom prst="rect">
-            <a:avLst/>
-          </a:prstGeom>
-        </p:spPr>
-        <p:txBody>
-          <a:bodyPr/>
-          <a:lstStyle/>
-          <a:p>
-            <a:endParaRPr lang="en-US" dirty="0"/>
           </a:p>
         </p:txBody>
       </p:sp>
@@ -3487,7 +3487,7 @@
       <p:grpSpPr/>
       <p:sp>
         <p:nvSpPr>
-          <p:cNvPr id="2" name="Text Placeholder 1"/>
+          <p:cNvPr id="3" name="Text Placeholder 2"/>
           <p:cNvSpPr>
             <a:spLocks noGrp="1"/>
           </p:cNvSpPr>
@@ -3791,7 +3791,7 @@
       <p:grpSpPr/>
       <p:sp>
         <p:nvSpPr>
-          <p:cNvPr id="2" name="Text Placeholder 1"/>
+          <p:cNvPr id="3" name="Text Placeholder 2"/>
           <p:cNvSpPr>
             <a:spLocks noGrp="1"/>
           </p:cNvSpPr>
@@ -3966,7 +3966,7 @@
       <p:grpSpPr/>
       <p:sp>
         <p:nvSpPr>
-          <p:cNvPr id="2" name="Text Placeholder 1"/>
+          <p:cNvPr id="3" name="Text Placeholder 2"/>
           <p:cNvSpPr>
             <a:spLocks noGrp="1"/>
           </p:cNvSpPr>
@@ -4844,7 +4844,7 @@
       <p:grpSpPr/>
       <p:sp>
         <p:nvSpPr>
-          <p:cNvPr id="2" name="Text Placeholder 1"/>
+          <p:cNvPr id="3" name="Text Placeholder 2"/>
           <p:cNvSpPr>
             <a:spLocks noGrp="1"/>
           </p:cNvSpPr>
@@ -4888,19 +4888,19 @@
           <a:p>
             <a:pPr lvl="1"/>
             <a:r>
-              <a:t>SRX4600 HA pair delivering 80 Gbps firewall throughput with full security services</a:t>
+              <a:t>SRX4600 HA pair delivering 80 Gbps firewall throughput with security</a:t>
             </a:r>
           </a:p>
           <a:p>
             <a:pPr lvl="1"/>
             <a:r>
-              <a:t>10 branch SRX300 firewalls with integrated SD-WAN and centralized management</a:t>
+              <a:t>10 branch SRX300 firewalls with SD-WAN and centralized management</a:t>
             </a:r>
           </a:p>
           <a:p>
             <a:pPr lvl="1"/>
             <a:r>
-              <a:t>Advanced IPS (40 Gbps), SSL inspection (20 Gbps), and ATP Cloud sandbox</a:t>
+              <a:t>Advanced IPS (40 Gbps), SSL inspection, and ATP Cloud sandbox</a:t>
             </a:r>
           </a:p>
           <a:p>
@@ -5003,7 +5003,7 @@
       <p:grpSpPr/>
       <p:sp>
         <p:nvSpPr>
-          <p:cNvPr id="2" name="Text Placeholder 1"/>
+          <p:cNvPr id="3" name="Text Placeholder 2"/>
           <p:cNvSpPr>
             <a:spLocks noGrp="1"/>
           </p:cNvSpPr>
@@ -5187,7 +5187,7 @@
       <p:grpSpPr/>
       <p:sp>
         <p:nvSpPr>
-          <p:cNvPr id="2" name="Text Placeholder 1"/>
+          <p:cNvPr id="3" name="Text Placeholder 2"/>
           <p:cNvSpPr>
             <a:spLocks noGrp="1"/>
           </p:cNvSpPr>
@@ -5676,7 +5676,7 @@
       <p:grpSpPr/>
       <p:sp>
         <p:nvSpPr>
-          <p:cNvPr id="2" name="Text Placeholder 1"/>
+          <p:cNvPr id="3" name="Text Placeholder 2"/>
           <p:cNvSpPr>
             <a:spLocks noGrp="1"/>
           </p:cNvSpPr>
@@ -5849,7 +5849,7 @@
       <p:grpSpPr/>
       <p:sp>
         <p:nvSpPr>
-          <p:cNvPr id="2" name="Text Placeholder 1"/>
+          <p:cNvPr id="3" name="Text Placeholder 2"/>
           <p:cNvSpPr>
             <a:spLocks noGrp="1"/>
           </p:cNvSpPr>
@@ -6036,7 +6036,7 @@
       <p:grpSpPr/>
       <p:sp>
         <p:nvSpPr>
-          <p:cNvPr id="2" name="Text Placeholder 1"/>
+          <p:cNvPr id="3" name="Text Placeholder 2"/>
           <p:cNvSpPr>
             <a:spLocks noGrp="1"/>
           </p:cNvSpPr>

</xml_diff>

<commit_message>
Fix Juniper infrastructure costs - remove Professional Services category
- Remove all Professional Services line items from infrastructure-costs.csv
- Professional Services belongs ONLY in level-of-effort-estimate.csv
- Update 3-Year Summary to remove Professional Services row
- SRX Firewall: 3-year total reduced from $539,700 to $438,400 (infrastructure only)
- Mist AI Network: 3-year total reduced from $304,964 to $223,964 (infrastructure only)
- Regenerate all presales documents with corrected infrastructure costs
- Fix Solution Briefing sub-item word counts (<13 words requirement)
</commit_message>
<xml_diff>
--- a/solutions/juniper/cyber-security/srx-firewall-platform/presales/solution-briefing.pptx
+++ b/solutions/juniper/cyber-security/srx-firewall-platform/presales/solution-briefing.pptx
@@ -3390,7 +3390,7 @@
           <a:lstStyle/>
           <a:p>
             <a:r>
-              <a:t>['Presenter Name'] | November 22, 2025</a:t>
+              <a:t>['Presenter Name'] | November 24, 2025</a:t>
             </a:r>
           </a:p>
         </p:txBody>
@@ -6259,7 +6259,7 @@
                     <a:p>
                       <a:r>
                         <a:rPr sz="1100"/>
-                        <a:t>$101,300</a:t>
+                        <a:t>$0</a:t>
                       </a:r>
                     </a:p>
                   </a:txBody>
@@ -6293,7 +6293,7 @@
                     <a:p>
                       <a:r>
                         <a:rPr sz="1100"/>
-                        <a:t>$101,300</a:t>
+                        <a:t>$0</a:t>
                       </a:r>
                     </a:p>
                   </a:txBody>
@@ -6344,7 +6344,7 @@
                     <a:p>
                       <a:r>
                         <a:rPr sz="1100"/>
-                        <a:t>$101,300</a:t>
+                        <a:t>$0</a:t>
                       </a:r>
                     </a:p>
                   </a:txBody>
@@ -6484,7 +6484,7 @@
                     <a:p>
                       <a:r>
                         <a:rPr sz="1100"/>
-                        <a:t>Software</a:t>
+                        <a:t>Software Licenses</a:t>
                       </a:r>
                     </a:p>
                   </a:txBody>
@@ -6743,7 +6743,7 @@
                     <a:p>
                       <a:r>
                         <a:rPr b="1" sz="1100"/>
-                        <a:t>$411,500</a:t>
+                        <a:t>$310,200</a:t>
                       </a:r>
                     </a:p>
                   </a:txBody>
@@ -6777,7 +6777,7 @@
                     <a:p>
                       <a:r>
                         <a:rPr b="1" sz="1100"/>
-                        <a:t>$382,500</a:t>
+                        <a:t>$281,200</a:t>
                       </a:r>
                     </a:p>
                   </a:txBody>
@@ -6828,7 +6828,7 @@
                     <a:p>
                       <a:r>
                         <a:rPr b="1" sz="1100"/>
-                        <a:t>$539,700</a:t>
+                        <a:t>$438,400</a:t>
                       </a:r>
                     </a:p>
                   </a:txBody>

</xml_diff>